<commit_message>
Add vera and stars scenario to coding service
</commit_message>
<xml_diff>
--- a/assets/figures.pptx
+++ b/assets/figures.pptx
@@ -9,7 +9,8 @@
     <p:sldId id="257" r:id="rId3"/>
     <p:sldId id="258" r:id="rId4"/>
     <p:sldId id="259" r:id="rId5"/>
-    <p:sldId id="260" r:id="rId6"/>
+    <p:sldId id="261" r:id="rId6"/>
+    <p:sldId id="260" r:id="rId7"/>
   </p:sldIdLst>
   <p:sldSz cx="6858000" cy="9144000" type="screen4x3"/>
   <p:notesSz cx="6858000" cy="9144000"/>
@@ -247,7 +248,7 @@
           <a:p>
             <a:fld id="{C07B6569-5EFF-41A8-B6CB-39864A9A9501}" type="datetimeFigureOut">
               <a:rPr lang="de-DE" smtClean="0"/>
-              <a:t>14.09.2025</a:t>
+              <a:t>15.09.2025</a:t>
             </a:fld>
             <a:endParaRPr lang="de-DE"/>
           </a:p>
@@ -417,7 +418,7 @@
           <a:p>
             <a:fld id="{C07B6569-5EFF-41A8-B6CB-39864A9A9501}" type="datetimeFigureOut">
               <a:rPr lang="de-DE" smtClean="0"/>
-              <a:t>14.09.2025</a:t>
+              <a:t>15.09.2025</a:t>
             </a:fld>
             <a:endParaRPr lang="de-DE"/>
           </a:p>
@@ -597,7 +598,7 @@
           <a:p>
             <a:fld id="{C07B6569-5EFF-41A8-B6CB-39864A9A9501}" type="datetimeFigureOut">
               <a:rPr lang="de-DE" smtClean="0"/>
-              <a:t>14.09.2025</a:t>
+              <a:t>15.09.2025</a:t>
             </a:fld>
             <a:endParaRPr lang="de-DE"/>
           </a:p>
@@ -844,7 +845,7 @@
           <a:p>
             <a:fld id="{C07B6569-5EFF-41A8-B6CB-39864A9A9501}" type="datetimeFigureOut">
               <a:rPr lang="de-DE" smtClean="0"/>
-              <a:t>14.09.2025</a:t>
+              <a:t>15.09.2025</a:t>
             </a:fld>
             <a:endParaRPr lang="de-DE"/>
           </a:p>
@@ -1088,7 +1089,7 @@
           <a:p>
             <a:fld id="{C07B6569-5EFF-41A8-B6CB-39864A9A9501}" type="datetimeFigureOut">
               <a:rPr lang="de-DE" smtClean="0"/>
-              <a:t>14.09.2025</a:t>
+              <a:t>15.09.2025</a:t>
             </a:fld>
             <a:endParaRPr lang="de-DE"/>
           </a:p>
@@ -1320,7 +1321,7 @@
           <a:p>
             <a:fld id="{C07B6569-5EFF-41A8-B6CB-39864A9A9501}" type="datetimeFigureOut">
               <a:rPr lang="de-DE" smtClean="0"/>
-              <a:t>14.09.2025</a:t>
+              <a:t>15.09.2025</a:t>
             </a:fld>
             <a:endParaRPr lang="de-DE"/>
           </a:p>
@@ -1687,7 +1688,7 @@
           <a:p>
             <a:fld id="{C07B6569-5EFF-41A8-B6CB-39864A9A9501}" type="datetimeFigureOut">
               <a:rPr lang="de-DE" smtClean="0"/>
-              <a:t>14.09.2025</a:t>
+              <a:t>15.09.2025</a:t>
             </a:fld>
             <a:endParaRPr lang="de-DE"/>
           </a:p>
@@ -1805,7 +1806,7 @@
           <a:p>
             <a:fld id="{C07B6569-5EFF-41A8-B6CB-39864A9A9501}" type="datetimeFigureOut">
               <a:rPr lang="de-DE" smtClean="0"/>
-              <a:t>14.09.2025</a:t>
+              <a:t>15.09.2025</a:t>
             </a:fld>
             <a:endParaRPr lang="de-DE"/>
           </a:p>
@@ -1900,7 +1901,7 @@
           <a:p>
             <a:fld id="{C07B6569-5EFF-41A8-B6CB-39864A9A9501}" type="datetimeFigureOut">
               <a:rPr lang="de-DE" smtClean="0"/>
-              <a:t>14.09.2025</a:t>
+              <a:t>15.09.2025</a:t>
             </a:fld>
             <a:endParaRPr lang="de-DE"/>
           </a:p>
@@ -2177,7 +2178,7 @@
           <a:p>
             <a:fld id="{C07B6569-5EFF-41A8-B6CB-39864A9A9501}" type="datetimeFigureOut">
               <a:rPr lang="de-DE" smtClean="0"/>
-              <a:t>14.09.2025</a:t>
+              <a:t>15.09.2025</a:t>
             </a:fld>
             <a:endParaRPr lang="de-DE"/>
           </a:p>
@@ -2434,7 +2435,7 @@
           <a:p>
             <a:fld id="{C07B6569-5EFF-41A8-B6CB-39864A9A9501}" type="datetimeFigureOut">
               <a:rPr lang="de-DE" smtClean="0"/>
-              <a:t>14.09.2025</a:t>
+              <a:t>15.09.2025</a:t>
             </a:fld>
             <a:endParaRPr lang="de-DE"/>
           </a:p>
@@ -2647,7 +2648,7 @@
           <a:p>
             <a:fld id="{C07B6569-5EFF-41A8-B6CB-39864A9A9501}" type="datetimeFigureOut">
               <a:rPr lang="de-DE" smtClean="0"/>
-              <a:t>14.09.2025</a:t>
+              <a:t>15.09.2025</a:t>
             </a:fld>
             <a:endParaRPr lang="de-DE"/>
           </a:p>
@@ -7111,6 +7112,1444 @@
       </p:grpSpPr>
       <p:sp>
         <p:nvSpPr>
+          <p:cNvPr id="56" name="Pfeil: nach rechts 55">
+            <a:extLst>
+              <a:ext uri="{FF2B5EF4-FFF2-40B4-BE49-F238E27FC236}">
+                <a16:creationId xmlns:a16="http://schemas.microsoft.com/office/drawing/2014/main" id="{8E0770B1-0687-4AE4-A351-D91B3356585F}"/>
+              </a:ext>
+            </a:extLst>
+          </p:cNvPr>
+          <p:cNvSpPr/>
+          <p:nvPr/>
+        </p:nvSpPr>
+        <p:spPr>
+          <a:xfrm rot="10800000" flipH="1">
+            <a:off x="2420232" y="2256760"/>
+            <a:ext cx="1523157" cy="317898"/>
+          </a:xfrm>
+          <a:prstGeom prst="rightArrow">
+            <a:avLst/>
+          </a:prstGeom>
+          <a:solidFill>
+            <a:srgbClr val="D6DCE5"/>
+          </a:solidFill>
+          <a:ln>
+            <a:noFill/>
+          </a:ln>
+        </p:spPr>
+        <p:style>
+          <a:lnRef idx="2">
+            <a:schemeClr val="accent1">
+              <a:shade val="50000"/>
+            </a:schemeClr>
+          </a:lnRef>
+          <a:fillRef idx="1">
+            <a:schemeClr val="accent1"/>
+          </a:fillRef>
+          <a:effectRef idx="0">
+            <a:schemeClr val="accent1"/>
+          </a:effectRef>
+          <a:fontRef idx="minor">
+            <a:schemeClr val="lt1"/>
+          </a:fontRef>
+        </p:style>
+        <p:txBody>
+          <a:bodyPr rtlCol="0" anchor="ctr"/>
+          <a:lstStyle/>
+          <a:p>
+            <a:pPr algn="ctr"/>
+            <a:endParaRPr lang="de-DE"/>
+          </a:p>
+        </p:txBody>
+      </p:sp>
+      <p:sp>
+        <p:nvSpPr>
+          <p:cNvPr id="53" name="Pfeil: nach rechts 52">
+            <a:extLst>
+              <a:ext uri="{FF2B5EF4-FFF2-40B4-BE49-F238E27FC236}">
+                <a16:creationId xmlns:a16="http://schemas.microsoft.com/office/drawing/2014/main" id="{6782127F-7395-40D6-BBE4-A9C252840B16}"/>
+              </a:ext>
+            </a:extLst>
+          </p:cNvPr>
+          <p:cNvSpPr/>
+          <p:nvPr/>
+        </p:nvSpPr>
+        <p:spPr>
+          <a:xfrm rot="10800000">
+            <a:off x="2583262" y="2938205"/>
+            <a:ext cx="1691476" cy="317898"/>
+          </a:xfrm>
+          <a:prstGeom prst="rightArrow">
+            <a:avLst/>
+          </a:prstGeom>
+          <a:solidFill>
+            <a:srgbClr val="D6DCE5"/>
+          </a:solidFill>
+          <a:ln>
+            <a:noFill/>
+          </a:ln>
+        </p:spPr>
+        <p:style>
+          <a:lnRef idx="2">
+            <a:schemeClr val="accent1">
+              <a:shade val="50000"/>
+            </a:schemeClr>
+          </a:lnRef>
+          <a:fillRef idx="1">
+            <a:schemeClr val="accent1"/>
+          </a:fillRef>
+          <a:effectRef idx="0">
+            <a:schemeClr val="accent1"/>
+          </a:effectRef>
+          <a:fontRef idx="minor">
+            <a:schemeClr val="lt1"/>
+          </a:fontRef>
+        </p:style>
+        <p:txBody>
+          <a:bodyPr rtlCol="0" anchor="ctr"/>
+          <a:lstStyle/>
+          <a:p>
+            <a:pPr algn="ctr"/>
+            <a:endParaRPr lang="de-DE"/>
+          </a:p>
+        </p:txBody>
+      </p:sp>
+      <p:sp>
+        <p:nvSpPr>
+          <p:cNvPr id="52" name="Pfeil: nach rechts 51">
+            <a:extLst>
+              <a:ext uri="{FF2B5EF4-FFF2-40B4-BE49-F238E27FC236}">
+                <a16:creationId xmlns:a16="http://schemas.microsoft.com/office/drawing/2014/main" id="{D596ED4A-B066-47F3-883E-6B929CE5C9D4}"/>
+              </a:ext>
+            </a:extLst>
+          </p:cNvPr>
+          <p:cNvSpPr/>
+          <p:nvPr/>
+        </p:nvSpPr>
+        <p:spPr>
+          <a:xfrm rot="10800000" flipH="1">
+            <a:off x="2420232" y="3192469"/>
+            <a:ext cx="1523157" cy="317898"/>
+          </a:xfrm>
+          <a:prstGeom prst="rightArrow">
+            <a:avLst/>
+          </a:prstGeom>
+          <a:solidFill>
+            <a:srgbClr val="D6DCE5"/>
+          </a:solidFill>
+          <a:ln>
+            <a:noFill/>
+          </a:ln>
+        </p:spPr>
+        <p:style>
+          <a:lnRef idx="2">
+            <a:schemeClr val="accent1">
+              <a:shade val="50000"/>
+            </a:schemeClr>
+          </a:lnRef>
+          <a:fillRef idx="1">
+            <a:schemeClr val="accent1"/>
+          </a:fillRef>
+          <a:effectRef idx="0">
+            <a:schemeClr val="accent1"/>
+          </a:effectRef>
+          <a:fontRef idx="minor">
+            <a:schemeClr val="lt1"/>
+          </a:fontRef>
+        </p:style>
+        <p:txBody>
+          <a:bodyPr rtlCol="0" anchor="ctr"/>
+          <a:lstStyle/>
+          <a:p>
+            <a:pPr algn="ctr"/>
+            <a:endParaRPr lang="de-DE"/>
+          </a:p>
+        </p:txBody>
+      </p:sp>
+      <p:sp>
+        <p:nvSpPr>
+          <p:cNvPr id="47" name="Pfeil: nach rechts 46">
+            <a:extLst>
+              <a:ext uri="{FF2B5EF4-FFF2-40B4-BE49-F238E27FC236}">
+                <a16:creationId xmlns:a16="http://schemas.microsoft.com/office/drawing/2014/main" id="{95CEDEDB-F285-455A-8EB9-7D990A4BA321}"/>
+              </a:ext>
+            </a:extLst>
+          </p:cNvPr>
+          <p:cNvSpPr/>
+          <p:nvPr/>
+        </p:nvSpPr>
+        <p:spPr>
+          <a:xfrm rot="10800000" flipH="1">
+            <a:off x="2420232" y="4404850"/>
+            <a:ext cx="1523157" cy="317898"/>
+          </a:xfrm>
+          <a:prstGeom prst="rightArrow">
+            <a:avLst/>
+          </a:prstGeom>
+          <a:solidFill>
+            <a:srgbClr val="D6DCE5"/>
+          </a:solidFill>
+          <a:ln>
+            <a:noFill/>
+          </a:ln>
+        </p:spPr>
+        <p:style>
+          <a:lnRef idx="2">
+            <a:schemeClr val="accent1">
+              <a:shade val="50000"/>
+            </a:schemeClr>
+          </a:lnRef>
+          <a:fillRef idx="1">
+            <a:schemeClr val="accent1"/>
+          </a:fillRef>
+          <a:effectRef idx="0">
+            <a:schemeClr val="accent1"/>
+          </a:effectRef>
+          <a:fontRef idx="minor">
+            <a:schemeClr val="lt1"/>
+          </a:fontRef>
+        </p:style>
+        <p:txBody>
+          <a:bodyPr rtlCol="0" anchor="ctr"/>
+          <a:lstStyle/>
+          <a:p>
+            <a:pPr algn="ctr"/>
+            <a:endParaRPr lang="de-DE"/>
+          </a:p>
+        </p:txBody>
+      </p:sp>
+      <p:sp>
+        <p:nvSpPr>
+          <p:cNvPr id="45" name="Pfeil: nach rechts 44">
+            <a:extLst>
+              <a:ext uri="{FF2B5EF4-FFF2-40B4-BE49-F238E27FC236}">
+                <a16:creationId xmlns:a16="http://schemas.microsoft.com/office/drawing/2014/main" id="{808225D5-188F-4A8B-B9BC-8EBEB9AFF2DE}"/>
+              </a:ext>
+            </a:extLst>
+          </p:cNvPr>
+          <p:cNvSpPr/>
+          <p:nvPr/>
+        </p:nvSpPr>
+        <p:spPr>
+          <a:xfrm rot="10800000">
+            <a:off x="2586771" y="3752796"/>
+            <a:ext cx="1691476" cy="317898"/>
+          </a:xfrm>
+          <a:prstGeom prst="rightArrow">
+            <a:avLst/>
+          </a:prstGeom>
+          <a:solidFill>
+            <a:srgbClr val="D6DCE5"/>
+          </a:solidFill>
+          <a:ln>
+            <a:noFill/>
+          </a:ln>
+        </p:spPr>
+        <p:style>
+          <a:lnRef idx="2">
+            <a:schemeClr val="accent1">
+              <a:shade val="50000"/>
+            </a:schemeClr>
+          </a:lnRef>
+          <a:fillRef idx="1">
+            <a:schemeClr val="accent1"/>
+          </a:fillRef>
+          <a:effectRef idx="0">
+            <a:schemeClr val="accent1"/>
+          </a:effectRef>
+          <a:fontRef idx="minor">
+            <a:schemeClr val="lt1"/>
+          </a:fontRef>
+        </p:style>
+        <p:txBody>
+          <a:bodyPr rtlCol="0" anchor="ctr"/>
+          <a:lstStyle/>
+          <a:p>
+            <a:pPr algn="ctr"/>
+            <a:endParaRPr lang="de-DE"/>
+          </a:p>
+        </p:txBody>
+      </p:sp>
+      <p:sp>
+        <p:nvSpPr>
+          <p:cNvPr id="2" name="Titel 1">
+            <a:extLst>
+              <a:ext uri="{FF2B5EF4-FFF2-40B4-BE49-F238E27FC236}">
+                <a16:creationId xmlns:a16="http://schemas.microsoft.com/office/drawing/2014/main" id="{0551B04D-69E8-4BFE-9F1D-951E570F0118}"/>
+              </a:ext>
+            </a:extLst>
+          </p:cNvPr>
+          <p:cNvSpPr>
+            <a:spLocks noGrp="1"/>
+          </p:cNvSpPr>
+          <p:nvPr>
+            <p:ph type="title"/>
+          </p:nvPr>
+        </p:nvSpPr>
+        <p:spPr/>
+        <p:txBody>
+          <a:bodyPr/>
+          <a:lstStyle/>
+          <a:p>
+            <a:r>
+              <a:rPr lang="de-DE"/>
+              <a:t>coding-service-vera.png</a:t>
+            </a:r>
+          </a:p>
+        </p:txBody>
+      </p:sp>
+      <p:sp>
+        <p:nvSpPr>
+          <p:cNvPr id="5" name="Rechteck 4">
+            <a:extLst>
+              <a:ext uri="{FF2B5EF4-FFF2-40B4-BE49-F238E27FC236}">
+                <a16:creationId xmlns:a16="http://schemas.microsoft.com/office/drawing/2014/main" id="{8D492F30-5400-4C0A-AFC2-EAC63131E272}"/>
+              </a:ext>
+            </a:extLst>
+          </p:cNvPr>
+          <p:cNvSpPr/>
+          <p:nvPr/>
+        </p:nvSpPr>
+        <p:spPr>
+          <a:xfrm>
+            <a:off x="2660399" y="2950619"/>
+            <a:ext cx="1272142" cy="312190"/>
+          </a:xfrm>
+          <a:prstGeom prst="rect">
+            <a:avLst/>
+          </a:prstGeom>
+          <a:noFill/>
+          <a:ln>
+            <a:noFill/>
+          </a:ln>
+        </p:spPr>
+        <p:style>
+          <a:lnRef idx="2">
+            <a:schemeClr val="accent1">
+              <a:shade val="50000"/>
+            </a:schemeClr>
+          </a:lnRef>
+          <a:fillRef idx="1">
+            <a:schemeClr val="accent1"/>
+          </a:fillRef>
+          <a:effectRef idx="0">
+            <a:schemeClr val="accent1"/>
+          </a:effectRef>
+          <a:fontRef idx="minor">
+            <a:schemeClr val="lt1"/>
+          </a:fontRef>
+        </p:style>
+        <p:txBody>
+          <a:bodyPr rtlCol="0" anchor="t"/>
+          <a:lstStyle/>
+          <a:p>
+            <a:pPr algn="ctr"/>
+            <a:r>
+              <a:rPr lang="de-DE" sz="1200">
+                <a:solidFill>
+                  <a:srgbClr val="405786"/>
+                </a:solidFill>
+              </a:rPr>
+              <a:t>Testhefte, Logins</a:t>
+            </a:r>
+            <a:endParaRPr lang="de-DE" sz="1400">
+              <a:solidFill>
+                <a:srgbClr val="405786"/>
+              </a:solidFill>
+            </a:endParaRPr>
+          </a:p>
+        </p:txBody>
+      </p:sp>
+      <p:sp>
+        <p:nvSpPr>
+          <p:cNvPr id="24" name="Rechteck: abgerundete Ecken 23">
+            <a:extLst>
+              <a:ext uri="{FF2B5EF4-FFF2-40B4-BE49-F238E27FC236}">
+                <a16:creationId xmlns:a16="http://schemas.microsoft.com/office/drawing/2014/main" id="{55A149B1-1B8A-4A2A-A04E-957240767D97}"/>
+              </a:ext>
+            </a:extLst>
+          </p:cNvPr>
+          <p:cNvSpPr/>
+          <p:nvPr/>
+        </p:nvSpPr>
+        <p:spPr>
+          <a:xfrm>
+            <a:off x="842318" y="2938048"/>
+            <a:ext cx="1676257" cy="566909"/>
+          </a:xfrm>
+          <a:prstGeom prst="roundRect">
+            <a:avLst/>
+          </a:prstGeom>
+          <a:solidFill>
+            <a:srgbClr val="008CBA"/>
+          </a:solidFill>
+          <a:ln>
+            <a:noFill/>
+          </a:ln>
+        </p:spPr>
+        <p:style>
+          <a:lnRef idx="2">
+            <a:schemeClr val="accent1">
+              <a:shade val="50000"/>
+            </a:schemeClr>
+          </a:lnRef>
+          <a:fillRef idx="1">
+            <a:schemeClr val="accent1"/>
+          </a:fillRef>
+          <a:effectRef idx="0">
+            <a:schemeClr val="accent1"/>
+          </a:effectRef>
+          <a:fontRef idx="minor">
+            <a:schemeClr val="lt1"/>
+          </a:fontRef>
+        </p:style>
+        <p:txBody>
+          <a:bodyPr rtlCol="0" anchor="ctr"/>
+          <a:lstStyle/>
+          <a:p>
+            <a:pPr algn="ctr"/>
+            <a:r>
+              <a:rPr lang="de-DE" sz="1400"/>
+              <a:t>IQB-Testcenter</a:t>
+            </a:r>
+            <a:endParaRPr lang="de-DE"/>
+          </a:p>
+        </p:txBody>
+      </p:sp>
+      <p:sp>
+        <p:nvSpPr>
+          <p:cNvPr id="28" name="Rechteck: abgerundete Ecken 27">
+            <a:extLst>
+              <a:ext uri="{FF2B5EF4-FFF2-40B4-BE49-F238E27FC236}">
+                <a16:creationId xmlns:a16="http://schemas.microsoft.com/office/drawing/2014/main" id="{18CDCB2C-10D5-4159-8DD6-1628F42C8F1C}"/>
+              </a:ext>
+            </a:extLst>
+          </p:cNvPr>
+          <p:cNvSpPr/>
+          <p:nvPr/>
+        </p:nvSpPr>
+        <p:spPr>
+          <a:xfrm>
+            <a:off x="842318" y="3776488"/>
+            <a:ext cx="1676257" cy="961458"/>
+          </a:xfrm>
+          <a:prstGeom prst="roundRect">
+            <a:avLst/>
+          </a:prstGeom>
+          <a:solidFill>
+            <a:srgbClr val="008CBA"/>
+          </a:solidFill>
+          <a:ln>
+            <a:noFill/>
+          </a:ln>
+        </p:spPr>
+        <p:style>
+          <a:lnRef idx="2">
+            <a:schemeClr val="accent1">
+              <a:shade val="50000"/>
+            </a:schemeClr>
+          </a:lnRef>
+          <a:fillRef idx="1">
+            <a:schemeClr val="accent1"/>
+          </a:fillRef>
+          <a:effectRef idx="0">
+            <a:schemeClr val="accent1"/>
+          </a:effectRef>
+          <a:fontRef idx="minor">
+            <a:schemeClr val="lt1"/>
+          </a:fontRef>
+        </p:style>
+        <p:txBody>
+          <a:bodyPr rtlCol="0" anchor="ctr"/>
+          <a:lstStyle/>
+          <a:p>
+            <a:pPr algn="ctr"/>
+            <a:r>
+              <a:rPr lang="de-DE" sz="1400"/>
+              <a:t>IQB-CodingService</a:t>
+            </a:r>
+            <a:endParaRPr lang="de-DE"/>
+          </a:p>
+        </p:txBody>
+      </p:sp>
+      <p:sp>
+        <p:nvSpPr>
+          <p:cNvPr id="33" name="Rechteck 32">
+            <a:extLst>
+              <a:ext uri="{FF2B5EF4-FFF2-40B4-BE49-F238E27FC236}">
+                <a16:creationId xmlns:a16="http://schemas.microsoft.com/office/drawing/2014/main" id="{E60FA52C-E5FD-4D73-BD0B-066F95104E73}"/>
+              </a:ext>
+            </a:extLst>
+          </p:cNvPr>
+          <p:cNvSpPr/>
+          <p:nvPr/>
+        </p:nvSpPr>
+        <p:spPr>
+          <a:xfrm>
+            <a:off x="3976878" y="2080260"/>
+            <a:ext cx="2230163" cy="3558540"/>
+          </a:xfrm>
+          <a:prstGeom prst="rect">
+            <a:avLst/>
+          </a:prstGeom>
+          <a:solidFill>
+            <a:srgbClr val="D6DCE5"/>
+          </a:solidFill>
+          <a:ln>
+            <a:noFill/>
+          </a:ln>
+        </p:spPr>
+        <p:style>
+          <a:lnRef idx="2">
+            <a:schemeClr val="accent1">
+              <a:shade val="50000"/>
+            </a:schemeClr>
+          </a:lnRef>
+          <a:fillRef idx="1">
+            <a:schemeClr val="accent1"/>
+          </a:fillRef>
+          <a:effectRef idx="0">
+            <a:schemeClr val="accent1"/>
+          </a:effectRef>
+          <a:fontRef idx="minor">
+            <a:schemeClr val="lt1"/>
+          </a:fontRef>
+        </p:style>
+        <p:txBody>
+          <a:bodyPr rtlCol="0" anchor="ctr"/>
+          <a:lstStyle/>
+          <a:p>
+            <a:pPr algn="r"/>
+            <a:endParaRPr lang="de-DE" sz="1600">
+              <a:solidFill>
+                <a:srgbClr val="405786"/>
+              </a:solidFill>
+            </a:endParaRPr>
+          </a:p>
+        </p:txBody>
+      </p:sp>
+      <p:sp>
+        <p:nvSpPr>
+          <p:cNvPr id="37" name="Rechteck 36">
+            <a:extLst>
+              <a:ext uri="{FF2B5EF4-FFF2-40B4-BE49-F238E27FC236}">
+                <a16:creationId xmlns:a16="http://schemas.microsoft.com/office/drawing/2014/main" id="{A169B987-A534-4CB7-A1B9-63A9F65E37E4}"/>
+              </a:ext>
+            </a:extLst>
+          </p:cNvPr>
+          <p:cNvSpPr/>
+          <p:nvPr/>
+        </p:nvSpPr>
+        <p:spPr>
+          <a:xfrm>
+            <a:off x="4124904" y="3182935"/>
+            <a:ext cx="1878368" cy="404398"/>
+          </a:xfrm>
+          <a:prstGeom prst="rect">
+            <a:avLst/>
+          </a:prstGeom>
+          <a:noFill/>
+          <a:ln>
+            <a:noFill/>
+          </a:ln>
+        </p:spPr>
+        <p:style>
+          <a:lnRef idx="2">
+            <a:schemeClr val="accent1">
+              <a:shade val="50000"/>
+            </a:schemeClr>
+          </a:lnRef>
+          <a:fillRef idx="1">
+            <a:schemeClr val="accent1"/>
+          </a:fillRef>
+          <a:effectRef idx="0">
+            <a:schemeClr val="accent1"/>
+          </a:effectRef>
+          <a:fontRef idx="minor">
+            <a:schemeClr val="lt1"/>
+          </a:fontRef>
+        </p:style>
+        <p:txBody>
+          <a:bodyPr rtlCol="0" anchor="t"/>
+          <a:lstStyle/>
+          <a:p>
+            <a:r>
+              <a:rPr lang="de-DE" sz="1200">
+                <a:solidFill>
+                  <a:srgbClr val="405786"/>
+                </a:solidFill>
+              </a:rPr>
+              <a:t>Transformation Antworten</a:t>
+            </a:r>
+          </a:p>
+        </p:txBody>
+      </p:sp>
+      <p:sp>
+        <p:nvSpPr>
+          <p:cNvPr id="38" name="Rechteck 37">
+            <a:extLst>
+              <a:ext uri="{FF2B5EF4-FFF2-40B4-BE49-F238E27FC236}">
+                <a16:creationId xmlns:a16="http://schemas.microsoft.com/office/drawing/2014/main" id="{36AA9122-78A1-4FE7-93DE-AF0FC8D3F9F2}"/>
+              </a:ext>
+            </a:extLst>
+          </p:cNvPr>
+          <p:cNvSpPr/>
+          <p:nvPr/>
+        </p:nvSpPr>
+        <p:spPr>
+          <a:xfrm>
+            <a:off x="4124904" y="3614576"/>
+            <a:ext cx="1942950" cy="504072"/>
+          </a:xfrm>
+          <a:prstGeom prst="rect">
+            <a:avLst/>
+          </a:prstGeom>
+          <a:noFill/>
+          <a:ln>
+            <a:noFill/>
+          </a:ln>
+        </p:spPr>
+        <p:style>
+          <a:lnRef idx="2">
+            <a:schemeClr val="accent1">
+              <a:shade val="50000"/>
+            </a:schemeClr>
+          </a:lnRef>
+          <a:fillRef idx="1">
+            <a:schemeClr val="accent1"/>
+          </a:fillRef>
+          <a:effectRef idx="0">
+            <a:schemeClr val="accent1"/>
+          </a:effectRef>
+          <a:fontRef idx="minor">
+            <a:schemeClr val="lt1"/>
+          </a:fontRef>
+        </p:style>
+        <p:txBody>
+          <a:bodyPr rtlCol="0" anchor="t"/>
+          <a:lstStyle/>
+          <a:p>
+            <a:r>
+              <a:rPr lang="de-DE" sz="1200">
+                <a:solidFill>
+                  <a:srgbClr val="405786"/>
+                </a:solidFill>
+              </a:rPr>
+              <a:t>Zusammenfassung von Personendaten</a:t>
+            </a:r>
+          </a:p>
+        </p:txBody>
+      </p:sp>
+      <p:sp>
+        <p:nvSpPr>
+          <p:cNvPr id="29" name="Rechteck: abgerundete Ecken 28">
+            <a:extLst>
+              <a:ext uri="{FF2B5EF4-FFF2-40B4-BE49-F238E27FC236}">
+                <a16:creationId xmlns:a16="http://schemas.microsoft.com/office/drawing/2014/main" id="{9FDE0028-0EE4-4C14-9A21-5BA76FD49DBA}"/>
+              </a:ext>
+            </a:extLst>
+          </p:cNvPr>
+          <p:cNvSpPr/>
+          <p:nvPr/>
+        </p:nvSpPr>
+        <p:spPr>
+          <a:xfrm>
+            <a:off x="4143415" y="2165014"/>
+            <a:ext cx="1897087" cy="491386"/>
+          </a:xfrm>
+          <a:prstGeom prst="roundRect">
+            <a:avLst/>
+          </a:prstGeom>
+          <a:solidFill>
+            <a:srgbClr val="7D12B9"/>
+          </a:solidFill>
+          <a:ln>
+            <a:noFill/>
+          </a:ln>
+        </p:spPr>
+        <p:style>
+          <a:lnRef idx="2">
+            <a:schemeClr val="accent1">
+              <a:shade val="50000"/>
+            </a:schemeClr>
+          </a:lnRef>
+          <a:fillRef idx="1">
+            <a:schemeClr val="accent1"/>
+          </a:fillRef>
+          <a:effectRef idx="0">
+            <a:schemeClr val="accent1"/>
+          </a:effectRef>
+          <a:fontRef idx="minor">
+            <a:schemeClr val="lt1"/>
+          </a:fontRef>
+        </p:style>
+        <p:txBody>
+          <a:bodyPr rtlCol="0" anchor="ctr"/>
+          <a:lstStyle/>
+          <a:p>
+            <a:pPr algn="ctr"/>
+            <a:r>
+              <a:rPr lang="de-DE" sz="1400"/>
+              <a:t>Landesportalsystem</a:t>
+            </a:r>
+            <a:endParaRPr lang="de-DE"/>
+          </a:p>
+        </p:txBody>
+      </p:sp>
+      <p:sp>
+        <p:nvSpPr>
+          <p:cNvPr id="39" name="Rechteck 38">
+            <a:extLst>
+              <a:ext uri="{FF2B5EF4-FFF2-40B4-BE49-F238E27FC236}">
+                <a16:creationId xmlns:a16="http://schemas.microsoft.com/office/drawing/2014/main" id="{2B9FEF30-B504-4280-9D45-C365E076D20C}"/>
+              </a:ext>
+            </a:extLst>
+          </p:cNvPr>
+          <p:cNvSpPr/>
+          <p:nvPr/>
+        </p:nvSpPr>
+        <p:spPr>
+          <a:xfrm>
+            <a:off x="4124904" y="4078823"/>
+            <a:ext cx="1903188" cy="337057"/>
+          </a:xfrm>
+          <a:prstGeom prst="rect">
+            <a:avLst/>
+          </a:prstGeom>
+          <a:noFill/>
+          <a:ln>
+            <a:noFill/>
+          </a:ln>
+        </p:spPr>
+        <p:style>
+          <a:lnRef idx="2">
+            <a:schemeClr val="accent1">
+              <a:shade val="50000"/>
+            </a:schemeClr>
+          </a:lnRef>
+          <a:fillRef idx="1">
+            <a:schemeClr val="accent1"/>
+          </a:fillRef>
+          <a:effectRef idx="0">
+            <a:schemeClr val="accent1"/>
+          </a:effectRef>
+          <a:fontRef idx="minor">
+            <a:schemeClr val="lt1"/>
+          </a:fontRef>
+        </p:style>
+        <p:txBody>
+          <a:bodyPr rtlCol="0" anchor="t"/>
+          <a:lstStyle/>
+          <a:p>
+            <a:r>
+              <a:rPr lang="de-DE" sz="1200">
+                <a:solidFill>
+                  <a:srgbClr val="405786"/>
+                </a:solidFill>
+              </a:rPr>
+              <a:t>Manuelle Kodierung</a:t>
+            </a:r>
+          </a:p>
+        </p:txBody>
+      </p:sp>
+      <p:sp>
+        <p:nvSpPr>
+          <p:cNvPr id="41" name="Rechteck 40">
+            <a:extLst>
+              <a:ext uri="{FF2B5EF4-FFF2-40B4-BE49-F238E27FC236}">
+                <a16:creationId xmlns:a16="http://schemas.microsoft.com/office/drawing/2014/main" id="{11699080-069A-4BBF-89B5-ECD97458B24F}"/>
+              </a:ext>
+            </a:extLst>
+          </p:cNvPr>
+          <p:cNvSpPr/>
+          <p:nvPr/>
+        </p:nvSpPr>
+        <p:spPr>
+          <a:xfrm>
+            <a:off x="4124904" y="2753811"/>
+            <a:ext cx="1676258" cy="436770"/>
+          </a:xfrm>
+          <a:prstGeom prst="rect">
+            <a:avLst/>
+          </a:prstGeom>
+          <a:noFill/>
+          <a:ln>
+            <a:noFill/>
+          </a:ln>
+        </p:spPr>
+        <p:style>
+          <a:lnRef idx="2">
+            <a:schemeClr val="accent1">
+              <a:shade val="50000"/>
+            </a:schemeClr>
+          </a:lnRef>
+          <a:fillRef idx="1">
+            <a:schemeClr val="accent1"/>
+          </a:fillRef>
+          <a:effectRef idx="0">
+            <a:schemeClr val="accent1"/>
+          </a:effectRef>
+          <a:fontRef idx="minor">
+            <a:schemeClr val="lt1"/>
+          </a:fontRef>
+        </p:style>
+        <p:txBody>
+          <a:bodyPr rtlCol="0" anchor="t"/>
+          <a:lstStyle/>
+          <a:p>
+            <a:r>
+              <a:rPr lang="de-DE" sz="1200">
+                <a:solidFill>
+                  <a:srgbClr val="405786"/>
+                </a:solidFill>
+              </a:rPr>
+              <a:t>Zuweisung Personen zu Testheften</a:t>
+            </a:r>
+          </a:p>
+        </p:txBody>
+      </p:sp>
+      <p:sp>
+        <p:nvSpPr>
+          <p:cNvPr id="42" name="Pfeil: nach links und rechts 41">
+            <a:extLst>
+              <a:ext uri="{FF2B5EF4-FFF2-40B4-BE49-F238E27FC236}">
+                <a16:creationId xmlns:a16="http://schemas.microsoft.com/office/drawing/2014/main" id="{DB134E8A-B06F-4954-956A-97E7E41D151E}"/>
+              </a:ext>
+            </a:extLst>
+          </p:cNvPr>
+          <p:cNvSpPr/>
+          <p:nvPr/>
+        </p:nvSpPr>
+        <p:spPr>
+          <a:xfrm rot="10800000">
+            <a:off x="2586772" y="4078823"/>
+            <a:ext cx="1356617" cy="317898"/>
+          </a:xfrm>
+          <a:prstGeom prst="leftRightArrow">
+            <a:avLst/>
+          </a:prstGeom>
+          <a:solidFill>
+            <a:srgbClr val="D6DCE5"/>
+          </a:solidFill>
+          <a:ln>
+            <a:noFill/>
+          </a:ln>
+        </p:spPr>
+        <p:style>
+          <a:lnRef idx="2">
+            <a:schemeClr val="accent1">
+              <a:shade val="50000"/>
+            </a:schemeClr>
+          </a:lnRef>
+          <a:fillRef idx="1">
+            <a:schemeClr val="accent1"/>
+          </a:fillRef>
+          <a:effectRef idx="0">
+            <a:schemeClr val="accent1"/>
+          </a:effectRef>
+          <a:fontRef idx="minor">
+            <a:schemeClr val="lt1"/>
+          </a:fontRef>
+        </p:style>
+        <p:txBody>
+          <a:bodyPr rtlCol="0" anchor="ctr"/>
+          <a:lstStyle/>
+          <a:p>
+            <a:pPr algn="ctr"/>
+            <a:endParaRPr lang="de-DE"/>
+          </a:p>
+        </p:txBody>
+      </p:sp>
+      <p:sp>
+        <p:nvSpPr>
+          <p:cNvPr id="43" name="Rechteck 42">
+            <a:extLst>
+              <a:ext uri="{FF2B5EF4-FFF2-40B4-BE49-F238E27FC236}">
+                <a16:creationId xmlns:a16="http://schemas.microsoft.com/office/drawing/2014/main" id="{89E45DD8-5AC8-452A-8CF4-54F340B0E071}"/>
+              </a:ext>
+            </a:extLst>
+          </p:cNvPr>
+          <p:cNvSpPr/>
+          <p:nvPr/>
+        </p:nvSpPr>
+        <p:spPr>
+          <a:xfrm>
+            <a:off x="2747770" y="3211688"/>
+            <a:ext cx="912402" cy="323060"/>
+          </a:xfrm>
+          <a:prstGeom prst="rect">
+            <a:avLst/>
+          </a:prstGeom>
+          <a:noFill/>
+          <a:ln>
+            <a:noFill/>
+          </a:ln>
+        </p:spPr>
+        <p:style>
+          <a:lnRef idx="2">
+            <a:schemeClr val="accent1">
+              <a:shade val="50000"/>
+            </a:schemeClr>
+          </a:lnRef>
+          <a:fillRef idx="1">
+            <a:schemeClr val="accent1"/>
+          </a:fillRef>
+          <a:effectRef idx="0">
+            <a:schemeClr val="accent1"/>
+          </a:effectRef>
+          <a:fontRef idx="minor">
+            <a:schemeClr val="lt1"/>
+          </a:fontRef>
+        </p:style>
+        <p:txBody>
+          <a:bodyPr rtlCol="0" anchor="t"/>
+          <a:lstStyle/>
+          <a:p>
+            <a:pPr algn="ctr"/>
+            <a:r>
+              <a:rPr lang="de-DE" sz="1200">
+                <a:solidFill>
+                  <a:srgbClr val="405786"/>
+                </a:solidFill>
+              </a:rPr>
+              <a:t>Antworten</a:t>
+            </a:r>
+            <a:endParaRPr lang="de-DE" sz="1400">
+              <a:solidFill>
+                <a:srgbClr val="405786"/>
+              </a:solidFill>
+            </a:endParaRPr>
+          </a:p>
+        </p:txBody>
+      </p:sp>
+      <p:sp>
+        <p:nvSpPr>
+          <p:cNvPr id="46" name="Rechteck 45">
+            <a:extLst>
+              <a:ext uri="{FF2B5EF4-FFF2-40B4-BE49-F238E27FC236}">
+                <a16:creationId xmlns:a16="http://schemas.microsoft.com/office/drawing/2014/main" id="{447F9071-D586-4080-ACEF-639E7E083537}"/>
+              </a:ext>
+            </a:extLst>
+          </p:cNvPr>
+          <p:cNvSpPr/>
+          <p:nvPr/>
+        </p:nvSpPr>
+        <p:spPr>
+          <a:xfrm>
+            <a:off x="2747770" y="3774276"/>
+            <a:ext cx="912402" cy="317898"/>
+          </a:xfrm>
+          <a:prstGeom prst="rect">
+            <a:avLst/>
+          </a:prstGeom>
+          <a:noFill/>
+          <a:ln>
+            <a:noFill/>
+          </a:ln>
+        </p:spPr>
+        <p:style>
+          <a:lnRef idx="2">
+            <a:schemeClr val="accent1">
+              <a:shade val="50000"/>
+            </a:schemeClr>
+          </a:lnRef>
+          <a:fillRef idx="1">
+            <a:schemeClr val="accent1"/>
+          </a:fillRef>
+          <a:effectRef idx="0">
+            <a:schemeClr val="accent1"/>
+          </a:effectRef>
+          <a:fontRef idx="minor">
+            <a:schemeClr val="lt1"/>
+          </a:fontRef>
+        </p:style>
+        <p:txBody>
+          <a:bodyPr rtlCol="0" anchor="t"/>
+          <a:lstStyle/>
+          <a:p>
+            <a:pPr algn="ctr"/>
+            <a:r>
+              <a:rPr lang="de-DE" sz="1200">
+                <a:solidFill>
+                  <a:srgbClr val="405786"/>
+                </a:solidFill>
+              </a:rPr>
+              <a:t>Antworten</a:t>
+            </a:r>
+            <a:endParaRPr lang="de-DE" sz="1400">
+              <a:solidFill>
+                <a:srgbClr val="405786"/>
+              </a:solidFill>
+            </a:endParaRPr>
+          </a:p>
+        </p:txBody>
+      </p:sp>
+      <p:sp>
+        <p:nvSpPr>
+          <p:cNvPr id="48" name="Rechteck 47">
+            <a:extLst>
+              <a:ext uri="{FF2B5EF4-FFF2-40B4-BE49-F238E27FC236}">
+                <a16:creationId xmlns:a16="http://schemas.microsoft.com/office/drawing/2014/main" id="{1E0FABDF-2317-4303-A7BD-8A147CEB1B88}"/>
+              </a:ext>
+            </a:extLst>
+          </p:cNvPr>
+          <p:cNvSpPr/>
+          <p:nvPr/>
+        </p:nvSpPr>
+        <p:spPr>
+          <a:xfrm>
+            <a:off x="2672838" y="4424605"/>
+            <a:ext cx="1062267" cy="323060"/>
+          </a:xfrm>
+          <a:prstGeom prst="rect">
+            <a:avLst/>
+          </a:prstGeom>
+          <a:noFill/>
+          <a:ln>
+            <a:noFill/>
+          </a:ln>
+        </p:spPr>
+        <p:style>
+          <a:lnRef idx="2">
+            <a:schemeClr val="accent1">
+              <a:shade val="50000"/>
+            </a:schemeClr>
+          </a:lnRef>
+          <a:fillRef idx="1">
+            <a:schemeClr val="accent1"/>
+          </a:fillRef>
+          <a:effectRef idx="0">
+            <a:schemeClr val="accent1"/>
+          </a:effectRef>
+          <a:fontRef idx="minor">
+            <a:schemeClr val="lt1"/>
+          </a:fontRef>
+        </p:style>
+        <p:txBody>
+          <a:bodyPr rtlCol="0" anchor="t"/>
+          <a:lstStyle/>
+          <a:p>
+            <a:pPr algn="ctr"/>
+            <a:r>
+              <a:rPr lang="de-DE" sz="1200">
+                <a:solidFill>
+                  <a:srgbClr val="405786"/>
+                </a:solidFill>
+              </a:rPr>
+              <a:t>Skalenwerte</a:t>
+            </a:r>
+            <a:endParaRPr lang="de-DE" sz="1400">
+              <a:solidFill>
+                <a:srgbClr val="405786"/>
+              </a:solidFill>
+            </a:endParaRPr>
+          </a:p>
+        </p:txBody>
+      </p:sp>
+      <p:sp>
+        <p:nvSpPr>
+          <p:cNvPr id="49" name="Rechteck 48">
+            <a:extLst>
+              <a:ext uri="{FF2B5EF4-FFF2-40B4-BE49-F238E27FC236}">
+                <a16:creationId xmlns:a16="http://schemas.microsoft.com/office/drawing/2014/main" id="{9E0FAA92-76A1-43B5-A73E-501E6515C764}"/>
+              </a:ext>
+            </a:extLst>
+          </p:cNvPr>
+          <p:cNvSpPr/>
+          <p:nvPr/>
+        </p:nvSpPr>
+        <p:spPr>
+          <a:xfrm>
+            <a:off x="4124904" y="5305424"/>
+            <a:ext cx="1903188" cy="337057"/>
+          </a:xfrm>
+          <a:prstGeom prst="rect">
+            <a:avLst/>
+          </a:prstGeom>
+          <a:noFill/>
+          <a:ln>
+            <a:noFill/>
+          </a:ln>
+        </p:spPr>
+        <p:style>
+          <a:lnRef idx="2">
+            <a:schemeClr val="accent1">
+              <a:shade val="50000"/>
+            </a:schemeClr>
+          </a:lnRef>
+          <a:fillRef idx="1">
+            <a:schemeClr val="accent1"/>
+          </a:fillRef>
+          <a:effectRef idx="0">
+            <a:schemeClr val="accent1"/>
+          </a:effectRef>
+          <a:fontRef idx="minor">
+            <a:schemeClr val="lt1"/>
+          </a:fontRef>
+        </p:style>
+        <p:txBody>
+          <a:bodyPr rtlCol="0" anchor="t"/>
+          <a:lstStyle/>
+          <a:p>
+            <a:r>
+              <a:rPr lang="de-DE" sz="1200">
+                <a:solidFill>
+                  <a:srgbClr val="405786"/>
+                </a:solidFill>
+              </a:rPr>
+              <a:t>Rückmeldung</a:t>
+            </a:r>
+          </a:p>
+        </p:txBody>
+      </p:sp>
+      <p:sp>
+        <p:nvSpPr>
+          <p:cNvPr id="50" name="Rechteck 49">
+            <a:extLst>
+              <a:ext uri="{FF2B5EF4-FFF2-40B4-BE49-F238E27FC236}">
+                <a16:creationId xmlns:a16="http://schemas.microsoft.com/office/drawing/2014/main" id="{0F10F39A-DEE5-417F-91DF-57AC6B95C10E}"/>
+              </a:ext>
+            </a:extLst>
+          </p:cNvPr>
+          <p:cNvSpPr/>
+          <p:nvPr/>
+        </p:nvSpPr>
+        <p:spPr>
+          <a:xfrm>
+            <a:off x="4124904" y="4413742"/>
+            <a:ext cx="1903188" cy="522105"/>
+          </a:xfrm>
+          <a:prstGeom prst="rect">
+            <a:avLst/>
+          </a:prstGeom>
+          <a:noFill/>
+          <a:ln>
+            <a:noFill/>
+          </a:ln>
+        </p:spPr>
+        <p:style>
+          <a:lnRef idx="2">
+            <a:schemeClr val="accent1">
+              <a:shade val="50000"/>
+            </a:schemeClr>
+          </a:lnRef>
+          <a:fillRef idx="1">
+            <a:schemeClr val="accent1"/>
+          </a:fillRef>
+          <a:effectRef idx="0">
+            <a:schemeClr val="accent1"/>
+          </a:effectRef>
+          <a:fontRef idx="minor">
+            <a:schemeClr val="lt1"/>
+          </a:fontRef>
+        </p:style>
+        <p:txBody>
+          <a:bodyPr rtlCol="0" anchor="t"/>
+          <a:lstStyle/>
+          <a:p>
+            <a:r>
+              <a:rPr lang="de-DE" sz="1200">
+                <a:solidFill>
+                  <a:srgbClr val="405786"/>
+                </a:solidFill>
+              </a:rPr>
+              <a:t>Transformation in eigene Skalen</a:t>
+            </a:r>
+          </a:p>
+        </p:txBody>
+      </p:sp>
+      <p:cxnSp>
+        <p:nvCxnSpPr>
+          <p:cNvPr id="21" name="Gerader Verbinder 20">
+            <a:extLst>
+              <a:ext uri="{FF2B5EF4-FFF2-40B4-BE49-F238E27FC236}">
+                <a16:creationId xmlns:a16="http://schemas.microsoft.com/office/drawing/2014/main" id="{309971D6-DD97-4ABD-8807-E42A785D7F03}"/>
+              </a:ext>
+            </a:extLst>
+          </p:cNvPr>
+          <p:cNvCxnSpPr>
+            <a:cxnSpLocks/>
+          </p:cNvCxnSpPr>
+          <p:nvPr/>
+        </p:nvCxnSpPr>
+        <p:spPr>
+          <a:xfrm>
+            <a:off x="4124904" y="3197114"/>
+            <a:ext cx="1903188" cy="0"/>
+          </a:xfrm>
+          <a:prstGeom prst="line">
+            <a:avLst/>
+          </a:prstGeom>
+          <a:ln>
+            <a:solidFill>
+              <a:srgbClr val="405786"/>
+            </a:solidFill>
+          </a:ln>
+        </p:spPr>
+        <p:style>
+          <a:lnRef idx="1">
+            <a:schemeClr val="accent1"/>
+          </a:lnRef>
+          <a:fillRef idx="0">
+            <a:schemeClr val="accent1"/>
+          </a:fillRef>
+          <a:effectRef idx="0">
+            <a:schemeClr val="accent1"/>
+          </a:effectRef>
+          <a:fontRef idx="minor">
+            <a:schemeClr val="tx1"/>
+          </a:fontRef>
+        </p:style>
+      </p:cxnSp>
+      <p:cxnSp>
+        <p:nvCxnSpPr>
+          <p:cNvPr id="51" name="Gerader Verbinder 50">
+            <a:extLst>
+              <a:ext uri="{FF2B5EF4-FFF2-40B4-BE49-F238E27FC236}">
+                <a16:creationId xmlns:a16="http://schemas.microsoft.com/office/drawing/2014/main" id="{D63E6CDF-7D22-41DD-9734-C92BED2F0A28}"/>
+              </a:ext>
+            </a:extLst>
+          </p:cNvPr>
+          <p:cNvCxnSpPr>
+            <a:cxnSpLocks/>
+          </p:cNvCxnSpPr>
+          <p:nvPr/>
+        </p:nvCxnSpPr>
+        <p:spPr>
+          <a:xfrm>
+            <a:off x="4124904" y="4379976"/>
+            <a:ext cx="1903188" cy="0"/>
+          </a:xfrm>
+          <a:prstGeom prst="line">
+            <a:avLst/>
+          </a:prstGeom>
+          <a:ln>
+            <a:solidFill>
+              <a:srgbClr val="405786"/>
+            </a:solidFill>
+          </a:ln>
+        </p:spPr>
+        <p:style>
+          <a:lnRef idx="1">
+            <a:schemeClr val="accent1"/>
+          </a:lnRef>
+          <a:fillRef idx="0">
+            <a:schemeClr val="accent1"/>
+          </a:fillRef>
+          <a:effectRef idx="0">
+            <a:schemeClr val="accent1"/>
+          </a:effectRef>
+          <a:fontRef idx="minor">
+            <a:schemeClr val="tx1"/>
+          </a:fontRef>
+        </p:style>
+      </p:cxnSp>
+      <p:sp>
+        <p:nvSpPr>
+          <p:cNvPr id="54" name="Rechteck 53">
+            <a:extLst>
+              <a:ext uri="{FF2B5EF4-FFF2-40B4-BE49-F238E27FC236}">
+                <a16:creationId xmlns:a16="http://schemas.microsoft.com/office/drawing/2014/main" id="{19E56569-12D7-4838-9C41-290707F74D50}"/>
+              </a:ext>
+            </a:extLst>
+          </p:cNvPr>
+          <p:cNvSpPr/>
+          <p:nvPr/>
+        </p:nvSpPr>
+        <p:spPr>
+          <a:xfrm>
+            <a:off x="4124904" y="4822062"/>
+            <a:ext cx="1903188" cy="522105"/>
+          </a:xfrm>
+          <a:prstGeom prst="rect">
+            <a:avLst/>
+          </a:prstGeom>
+          <a:noFill/>
+          <a:ln>
+            <a:noFill/>
+          </a:ln>
+        </p:spPr>
+        <p:style>
+          <a:lnRef idx="2">
+            <a:schemeClr val="accent1">
+              <a:shade val="50000"/>
+            </a:schemeClr>
+          </a:lnRef>
+          <a:fillRef idx="1">
+            <a:schemeClr val="accent1"/>
+          </a:fillRef>
+          <a:effectRef idx="0">
+            <a:schemeClr val="accent1"/>
+          </a:effectRef>
+          <a:fontRef idx="minor">
+            <a:schemeClr val="lt1"/>
+          </a:fontRef>
+        </p:style>
+        <p:txBody>
+          <a:bodyPr rtlCol="0" anchor="t"/>
+          <a:lstStyle/>
+          <a:p>
+            <a:r>
+              <a:rPr lang="de-DE" sz="1200">
+                <a:solidFill>
+                  <a:srgbClr val="405786"/>
+                </a:solidFill>
+              </a:rPr>
+              <a:t>Aggregationen Personengruppen</a:t>
+            </a:r>
+          </a:p>
+        </p:txBody>
+      </p:sp>
+      <p:sp>
+        <p:nvSpPr>
+          <p:cNvPr id="55" name="Rechteck: abgerundete Ecken 54">
+            <a:extLst>
+              <a:ext uri="{FF2B5EF4-FFF2-40B4-BE49-F238E27FC236}">
+                <a16:creationId xmlns:a16="http://schemas.microsoft.com/office/drawing/2014/main" id="{D80FD2EA-39F5-4A60-B97E-43A066217136}"/>
+              </a:ext>
+            </a:extLst>
+          </p:cNvPr>
+          <p:cNvSpPr/>
+          <p:nvPr/>
+        </p:nvSpPr>
+        <p:spPr>
+          <a:xfrm>
+            <a:off x="842318" y="2128711"/>
+            <a:ext cx="1676257" cy="566909"/>
+          </a:xfrm>
+          <a:prstGeom prst="roundRect">
+            <a:avLst/>
+          </a:prstGeom>
+          <a:solidFill>
+            <a:srgbClr val="008CBA"/>
+          </a:solidFill>
+          <a:ln>
+            <a:noFill/>
+          </a:ln>
+        </p:spPr>
+        <p:style>
+          <a:lnRef idx="2">
+            <a:schemeClr val="accent1">
+              <a:shade val="50000"/>
+            </a:schemeClr>
+          </a:lnRef>
+          <a:fillRef idx="1">
+            <a:schemeClr val="accent1"/>
+          </a:fillRef>
+          <a:effectRef idx="0">
+            <a:schemeClr val="accent1"/>
+          </a:effectRef>
+          <a:fontRef idx="minor">
+            <a:schemeClr val="lt1"/>
+          </a:fontRef>
+        </p:style>
+        <p:txBody>
+          <a:bodyPr rtlCol="0" anchor="ctr"/>
+          <a:lstStyle/>
+          <a:p>
+            <a:pPr algn="ctr"/>
+            <a:r>
+              <a:rPr lang="de-DE" sz="1400"/>
+              <a:t>Survey Content Pool</a:t>
+            </a:r>
+            <a:endParaRPr lang="de-DE"/>
+          </a:p>
+        </p:txBody>
+      </p:sp>
+      <p:sp>
+        <p:nvSpPr>
+          <p:cNvPr id="57" name="Rechteck 56">
+            <a:extLst>
+              <a:ext uri="{FF2B5EF4-FFF2-40B4-BE49-F238E27FC236}">
+                <a16:creationId xmlns:a16="http://schemas.microsoft.com/office/drawing/2014/main" id="{4F292E1B-316F-4BB3-B8A9-D3804172848E}"/>
+              </a:ext>
+            </a:extLst>
+          </p:cNvPr>
+          <p:cNvSpPr/>
+          <p:nvPr/>
+        </p:nvSpPr>
+        <p:spPr>
+          <a:xfrm>
+            <a:off x="2620175" y="2179648"/>
+            <a:ext cx="1130749" cy="323060"/>
+          </a:xfrm>
+          <a:prstGeom prst="rect">
+            <a:avLst/>
+          </a:prstGeom>
+          <a:noFill/>
+          <a:ln>
+            <a:noFill/>
+          </a:ln>
+        </p:spPr>
+        <p:style>
+          <a:lnRef idx="2">
+            <a:schemeClr val="accent1">
+              <a:shade val="50000"/>
+            </a:schemeClr>
+          </a:lnRef>
+          <a:fillRef idx="1">
+            <a:schemeClr val="accent1"/>
+          </a:fillRef>
+          <a:effectRef idx="0">
+            <a:schemeClr val="accent1"/>
+          </a:effectRef>
+          <a:fontRef idx="minor">
+            <a:schemeClr val="lt1"/>
+          </a:fontRef>
+        </p:style>
+        <p:txBody>
+          <a:bodyPr rtlCol="0" anchor="t"/>
+          <a:lstStyle/>
+          <a:p>
+            <a:pPr algn="ctr"/>
+            <a:r>
+              <a:rPr lang="de-DE" sz="1200">
+                <a:solidFill>
+                  <a:srgbClr val="405786"/>
+                </a:solidFill>
+              </a:rPr>
+              <a:t>Survey Content Package</a:t>
+            </a:r>
+            <a:endParaRPr lang="de-DE" sz="1400">
+              <a:solidFill>
+                <a:srgbClr val="405786"/>
+              </a:solidFill>
+            </a:endParaRPr>
+          </a:p>
+        </p:txBody>
+      </p:sp>
+    </p:spTree>
+    <p:extLst>
+      <p:ext uri="{BB962C8B-B14F-4D97-AF65-F5344CB8AC3E}">
+        <p14:creationId xmlns:p14="http://schemas.microsoft.com/office/powerpoint/2010/main" val="2712301531"/>
+      </p:ext>
+    </p:extLst>
+  </p:cSld>
+  <p:clrMapOvr>
+    <a:masterClrMapping/>
+  </p:clrMapOvr>
+</p:sld>
+</file>
+
+<file path=ppt/slides/slide6.xml><?xml version="1.0" encoding="utf-8"?>
+<p:sld xmlns:a="http://schemas.openxmlformats.org/drawingml/2006/main" xmlns:r="http://schemas.openxmlformats.org/officeDocument/2006/relationships" xmlns:p="http://schemas.openxmlformats.org/presentationml/2006/main">
+  <p:cSld>
+    <p:spTree>
+      <p:nvGrpSpPr>
+        <p:cNvPr id="1" name=""/>
+        <p:cNvGrpSpPr/>
+        <p:nvPr/>
+      </p:nvGrpSpPr>
+      <p:grpSpPr>
+        <a:xfrm>
+          <a:off x="0" y="0"/>
+          <a:ext cx="0" cy="0"/>
+          <a:chOff x="0" y="0"/>
+          <a:chExt cx="0" cy="0"/>
+        </a:xfrm>
+      </p:grpSpPr>
+      <p:sp>
+        <p:nvSpPr>
           <p:cNvPr id="2" name="Titel 1">
             <a:extLst>
               <a:ext uri="{FF2B5EF4-FFF2-40B4-BE49-F238E27FC236}">

</xml_diff>